<commit_message>
Commit new practice code
</commit_message>
<xml_diff>
--- a/WebLecture/Lecture18-Javascript9.pptx
+++ b/WebLecture/Lecture18-Javascript9.pptx
@@ -3970,7 +3970,7 @@
             <a:fld id="{8BEFEC64-3B02-48AC-B709-B2823D518D38}" type="datetimeFigureOut">
               <a:rPr lang="zh-CN" altLang="en-US" smtClean="0"/>
               <a:pPr/>
-              <a:t>2022/4/8</a:t>
+              <a:t>2022/4/9</a:t>
             </a:fld>
             <a:endParaRPr lang="zh-CN" altLang="en-US" dirty="0"/>
           </a:p>
@@ -4371,7 +4371,7 @@
           <a:p>
             <a:fld id="{82F288E0-7875-42C4-84C8-98DBBD3BF4D2}" type="datetimeFigureOut">
               <a:rPr lang="zh-CN" altLang="en-US" smtClean="0"/>
-              <a:t>2022/4/8</a:t>
+              <a:t>2022/4/9</a:t>
             </a:fld>
             <a:endParaRPr lang="zh-CN" altLang="en-US"/>
           </a:p>
@@ -4517,7 +4517,7 @@
           <a:p>
             <a:fld id="{82F288E0-7875-42C4-84C8-98DBBD3BF4D2}" type="datetimeFigureOut">
               <a:rPr lang="zh-CN" altLang="en-US" smtClean="0"/>
-              <a:t>2022/4/8</a:t>
+              <a:t>2022/4/9</a:t>
             </a:fld>
             <a:endParaRPr lang="zh-CN" altLang="en-US"/>
           </a:p>
@@ -4680,7 +4680,7 @@
           <a:p>
             <a:fld id="{82F288E0-7875-42C4-84C8-98DBBD3BF4D2}" type="datetimeFigureOut">
               <a:rPr lang="zh-CN" altLang="en-US" smtClean="0"/>
-              <a:t>2022/4/8</a:t>
+              <a:t>2022/4/9</a:t>
             </a:fld>
             <a:endParaRPr lang="zh-CN" altLang="en-US"/>
           </a:p>
@@ -4920,7 +4920,7 @@
           <a:p>
             <a:fld id="{82F288E0-7875-42C4-84C8-98DBBD3BF4D2}" type="datetimeFigureOut">
               <a:rPr lang="zh-CN" altLang="en-US" smtClean="0"/>
-              <a:t>2022/4/8</a:t>
+              <a:t>2022/4/9</a:t>
             </a:fld>
             <a:endParaRPr lang="zh-CN" altLang="en-US"/>
           </a:p>
@@ -5144,7 +5144,7 @@
           <a:p>
             <a:fld id="{82F288E0-7875-42C4-84C8-98DBBD3BF4D2}" type="datetimeFigureOut">
               <a:rPr lang="zh-CN" altLang="en-US" smtClean="0"/>
-              <a:t>2022/4/8</a:t>
+              <a:t>2022/4/9</a:t>
             </a:fld>
             <a:endParaRPr lang="zh-CN" altLang="en-US"/>
           </a:p>
@@ -5503,7 +5503,7 @@
           <a:p>
             <a:fld id="{82F288E0-7875-42C4-84C8-98DBBD3BF4D2}" type="datetimeFigureOut">
               <a:rPr lang="zh-CN" altLang="en-US" smtClean="0"/>
-              <a:t>2022/4/8</a:t>
+              <a:t>2022/4/9</a:t>
             </a:fld>
             <a:endParaRPr lang="zh-CN" altLang="en-US"/>
           </a:p>
@@ -5615,7 +5615,7 @@
           <a:p>
             <a:fld id="{82F288E0-7875-42C4-84C8-98DBBD3BF4D2}" type="datetimeFigureOut">
               <a:rPr lang="zh-CN" altLang="en-US" smtClean="0"/>
-              <a:t>2022/4/8</a:t>
+              <a:t>2022/4/9</a:t>
             </a:fld>
             <a:endParaRPr lang="zh-CN" altLang="en-US"/>
           </a:p>
@@ -5705,7 +5705,7 @@
           <a:p>
             <a:fld id="{82F288E0-7875-42C4-84C8-98DBBD3BF4D2}" type="datetimeFigureOut">
               <a:rPr lang="zh-CN" altLang="en-US" smtClean="0"/>
-              <a:t>2022/4/8</a:t>
+              <a:t>2022/4/9</a:t>
             </a:fld>
             <a:endParaRPr lang="zh-CN" altLang="en-US"/>
           </a:p>
@@ -5952,7 +5952,7 @@
           <a:p>
             <a:fld id="{82F288E0-7875-42C4-84C8-98DBBD3BF4D2}" type="datetimeFigureOut">
               <a:rPr lang="zh-CN" altLang="en-US" smtClean="0"/>
-              <a:t>2022/4/8</a:t>
+              <a:t>2022/4/9</a:t>
             </a:fld>
             <a:endParaRPr lang="zh-CN" altLang="en-US"/>
           </a:p>
@@ -6125,7 +6125,7 @@
           <a:p>
             <a:fld id="{82F288E0-7875-42C4-84C8-98DBBD3BF4D2}" type="datetimeFigureOut">
               <a:rPr lang="zh-CN" altLang="en-US" smtClean="0"/>
-              <a:t>2022/4/8</a:t>
+              <a:t>2022/4/9</a:t>
             </a:fld>
             <a:endParaRPr lang="zh-CN" altLang="en-US"/>
           </a:p>
@@ -6339,7 +6339,7 @@
             <a:fld id="{82F288E0-7875-42C4-84C8-98DBBD3BF4D2}" type="datetimeFigureOut">
               <a:rPr lang="zh-CN" altLang="en-US" smtClean="0"/>
               <a:pPr/>
-              <a:t>2022/4/8</a:t>
+              <a:t>2022/4/9</a:t>
             </a:fld>
             <a:endParaRPr lang="zh-CN" altLang="en-US" dirty="0"/>
           </a:p>
@@ -19316,7 +19316,33 @@
                 <a:effectLst/>
                 <a:latin typeface="Verdana" panose="020B0604030504040204" pitchFamily="34" charset="0"/>
               </a:rPr>
-              <a:t>Make a "Good day" greeting if the hour is less than 18:00:</a:t>
+              <a:t>Make a "Good </a:t>
+            </a:r>
+            <a:r>
+              <a:rPr lang="en-US" altLang="en-US" sz="2400" dirty="0">
+                <a:solidFill>
+                  <a:schemeClr val="bg1">
+                    <a:lumMod val="95000"/>
+                  </a:schemeClr>
+                </a:solidFill>
+                <a:latin typeface="Verdana" panose="020B0604030504040204" pitchFamily="34" charset="0"/>
+              </a:rPr>
+              <a:t>morning</a:t>
+            </a:r>
+            <a:r>
+              <a:rPr kumimoji="0" lang="en-US" altLang="en-US" sz="2400" b="0" i="0" u="none" strike="noStrike" cap="none" normalizeH="0" baseline="0" dirty="0">
+                <a:ln>
+                  <a:noFill/>
+                </a:ln>
+                <a:solidFill>
+                  <a:schemeClr val="bg1">
+                    <a:lumMod val="95000"/>
+                  </a:schemeClr>
+                </a:solidFill>
+                <a:effectLst/>
+                <a:latin typeface="Verdana" panose="020B0604030504040204" pitchFamily="34" charset="0"/>
+              </a:rPr>
+              <a:t>" greeting if the hour is less than 10:00:</a:t>
             </a:r>
           </a:p>
           <a:p>
@@ -19347,7 +19373,7 @@
                 <a:effectLst/>
                 <a:latin typeface="Consolas" panose="020B0609020204030204" pitchFamily="49" charset="0"/>
               </a:rPr>
-              <a:t>if (hour &lt; 18) {</a:t>
+              <a:t>if (hour &lt; 10) {</a:t>
             </a:r>
             <a:br>
               <a:rPr kumimoji="0" lang="en-US" altLang="en-US" sz="2400" b="0" i="0" u="none" strike="noStrike" cap="none" normalizeH="0" baseline="0" dirty="0">
@@ -19372,7 +19398,29 @@
                 <a:effectLst/>
                 <a:latin typeface="Consolas" panose="020B0609020204030204" pitchFamily="49" charset="0"/>
               </a:rPr>
-              <a:t>  greeting = "Good day";</a:t>
+              <a:t>  greeting = "Good </a:t>
+            </a:r>
+            <a:r>
+              <a:rPr lang="en-US" altLang="en-US" sz="2400" dirty="0">
+                <a:solidFill>
+                  <a:srgbClr val="FFFF00"/>
+                </a:solidFill>
+                <a:latin typeface="Consolas" panose="020B0609020204030204" pitchFamily="49" charset="0"/>
+              </a:rPr>
+              <a:t>morning</a:t>
+            </a:r>
+            <a:r>
+              <a:rPr kumimoji="0" lang="en-US" altLang="en-US" sz="2400" b="0" i="0" u="none" strike="noStrike" cap="none" normalizeH="0" baseline="0" dirty="0">
+                <a:ln>
+                  <a:noFill/>
+                </a:ln>
+                <a:solidFill>
+                  <a:srgbClr val="FFFF00"/>
+                </a:solidFill>
+                <a:effectLst/>
+                <a:latin typeface="Consolas" panose="020B0609020204030204" pitchFamily="49" charset="0"/>
+              </a:rPr>
+              <a:t>";</a:t>
             </a:r>
             <a:br>
               <a:rPr kumimoji="0" lang="en-US" altLang="en-US" sz="2400" b="0" i="0" u="none" strike="noStrike" cap="none" normalizeH="0" baseline="0" dirty="0">
@@ -19472,7 +19520,17 @@
                 <a:latin typeface="Courier New" panose="02070409020205090404" pitchFamily="49" charset="0"/>
                 <a:cs typeface="Courier New" panose="02070409020205090404" pitchFamily="49" charset="0"/>
               </a:rPr>
-              <a:t>Good day</a:t>
+              <a:t>Good </a:t>
+            </a:r>
+            <a:r>
+              <a:rPr lang="en-US" altLang="en-US" sz="2400" dirty="0">
+                <a:solidFill>
+                  <a:srgbClr val="FFFF00"/>
+                </a:solidFill>
+                <a:latin typeface="Courier New" panose="02070409020205090404" pitchFamily="49" charset="0"/>
+                <a:cs typeface="Courier New" panose="02070409020205090404" pitchFamily="49" charset="0"/>
+              </a:rPr>
+              <a:t>morning</a:t>
             </a:r>
             <a:endParaRPr kumimoji="0" lang="en-US" altLang="en-US" sz="2400" b="0" i="0" u="none" strike="noStrike" cap="none" normalizeH="0" baseline="0" dirty="0">
               <a:ln>

</xml_diff>